<commit_message>
Update 01. GitHub, 형상관리란 무엇인가.pptx
</commit_message>
<xml_diff>
--- a/교육자료/01. 형상관리 도구편/01. GitHub/01. GitHub, 형상관리란 무엇인가.pptx
+++ b/교육자료/01. 형상관리 도구편/01. GitHub/01. GitHub, 형상관리란 무엇인가.pptx
@@ -3069,7 +3069,31 @@
                   <a:schemeClr val="bg1"/>
                 </a:solidFill>
               </a:rPr>
-              <a:t>는 버전 제어 및 공동 작업을 위한 코드 호스팅 플랫폼입니다</a:t>
+              <a:t>는 버전 제어 및 공동 작업을 위한 코드 </a:t>
+            </a:r>
+            <a:r>
+              <a:rPr lang="ko-KR" altLang="en-US" dirty="0" err="1" smtClean="0">
+                <a:solidFill>
+                  <a:schemeClr val="bg1"/>
+                </a:solidFill>
+              </a:rPr>
+              <a:t>호스팅</a:t>
+            </a:r>
+            <a:r>
+              <a:rPr lang="ko-KR" altLang="en-US" smtClean="0">
+                <a:solidFill>
+                  <a:schemeClr val="bg1"/>
+                </a:solidFill>
+              </a:rPr>
+              <a:t> </a:t>
+            </a:r>
+            <a:r>
+              <a:rPr lang="ko-KR" altLang="en-US" smtClean="0">
+                <a:solidFill>
+                  <a:schemeClr val="bg1"/>
+                </a:solidFill>
+              </a:rPr>
+              <a:t>플랫폼 입니다</a:t>
             </a:r>
             <a:r>
               <a:rPr lang="en-US" altLang="ko-KR" dirty="0" smtClean="0">

</xml_diff>